<commit_message>
added audience participation links
</commit_message>
<xml_diff>
--- a/2020-01-30 - MTX Portland - AD User Lifecycle/MTX Portland - Automating AD User Lifecycle.pptx
+++ b/2020-01-30 - MTX Portland - AD User Lifecycle/MTX Portland - Automating AD User Lifecycle.pptx
@@ -114,6 +114,11 @@
       </a:defRPr>
     </a:lvl9pPr>
   </p:defaultTextStyle>
+  <p:extLst>
+    <p:ext uri="{EFAFB233-063F-42B5-8137-9DF3F51BA10A}">
+      <p15:sldGuideLst xmlns:p15="http://schemas.microsoft.com/office/powerpoint/2012/main"/>
+    </p:ext>
+  </p:extLst>
 </p:presentation>
 </file>
 
@@ -4445,6 +4450,29 @@
         <p:txBody>
           <a:bodyPr/>
           <a:lstStyle/>
+          <a:p>
+            <a:r>
+              <a:rPr lang="en-US" dirty="0">
+                <a:hlinkClick r:id="rId2"/>
+              </a:rPr>
+              <a:t>anthony@howell-it.com</a:t>
+            </a:r>
+            <a:r>
+              <a:rPr lang="en-US" dirty="0"/>
+              <a:t> </a:t>
+            </a:r>
+          </a:p>
+          <a:p>
+            <a:r>
+              <a:rPr lang="en-US" dirty="0"/>
+              <a:t>@</a:t>
+            </a:r>
+            <a:r>
+              <a:rPr lang="en-US" dirty="0" err="1"/>
+              <a:t>theposhwolf</a:t>
+            </a:r>
+            <a:endParaRPr lang="en-US"/>
+          </a:p>
           <a:p>
             <a:endParaRPr lang="en-US"/>
           </a:p>

</xml_diff>

<commit_message>
added a slide about the demo environment
</commit_message>
<xml_diff>
--- a/2020-01-30 - MTX Portland - AD User Lifecycle/MTX Portland - Automating AD User Lifecycle.pptx
+++ b/2020-01-30 - MTX Portland - AD User Lifecycle/MTX Portland - Automating AD User Lifecycle.pptx
@@ -11,11 +11,12 @@
     <p:sldId id="258" r:id="rId5"/>
     <p:sldId id="259" r:id="rId6"/>
     <p:sldId id="260" r:id="rId7"/>
-    <p:sldId id="261" r:id="rId8"/>
-    <p:sldId id="262" r:id="rId9"/>
-    <p:sldId id="263" r:id="rId10"/>
-    <p:sldId id="264" r:id="rId11"/>
-    <p:sldId id="265" r:id="rId12"/>
+    <p:sldId id="267" r:id="rId8"/>
+    <p:sldId id="261" r:id="rId9"/>
+    <p:sldId id="262" r:id="rId10"/>
+    <p:sldId id="263" r:id="rId11"/>
+    <p:sldId id="264" r:id="rId12"/>
+    <p:sldId id="265" r:id="rId13"/>
   </p:sldIdLst>
   <p:sldSz cx="12192000" cy="6858000"/>
   <p:notesSz cx="6858000" cy="9144000"/>
@@ -269,7 +270,7 @@
           <a:p>
             <a:fld id="{D46B952B-F692-4DD1-9678-FCDA40C3FC40}" type="datetimeFigureOut">
               <a:rPr lang="en-US" smtClean="0"/>
-              <a:t>1/3/2020</a:t>
+              <a:t>1/24/2020</a:t>
             </a:fld>
             <a:endParaRPr lang="en-US"/>
           </a:p>
@@ -467,7 +468,7 @@
           <a:p>
             <a:fld id="{D46B952B-F692-4DD1-9678-FCDA40C3FC40}" type="datetimeFigureOut">
               <a:rPr lang="en-US" smtClean="0"/>
-              <a:t>1/3/2020</a:t>
+              <a:t>1/24/2020</a:t>
             </a:fld>
             <a:endParaRPr lang="en-US"/>
           </a:p>
@@ -675,7 +676,7 @@
           <a:p>
             <a:fld id="{D46B952B-F692-4DD1-9678-FCDA40C3FC40}" type="datetimeFigureOut">
               <a:rPr lang="en-US" smtClean="0"/>
-              <a:t>1/3/2020</a:t>
+              <a:t>1/24/2020</a:t>
             </a:fld>
             <a:endParaRPr lang="en-US"/>
           </a:p>
@@ -873,7 +874,7 @@
           <a:p>
             <a:fld id="{D46B952B-F692-4DD1-9678-FCDA40C3FC40}" type="datetimeFigureOut">
               <a:rPr lang="en-US" smtClean="0"/>
-              <a:t>1/3/2020</a:t>
+              <a:t>1/24/2020</a:t>
             </a:fld>
             <a:endParaRPr lang="en-US"/>
           </a:p>
@@ -1148,7 +1149,7 @@
           <a:p>
             <a:fld id="{D46B952B-F692-4DD1-9678-FCDA40C3FC40}" type="datetimeFigureOut">
               <a:rPr lang="en-US" smtClean="0"/>
-              <a:t>1/3/2020</a:t>
+              <a:t>1/24/2020</a:t>
             </a:fld>
             <a:endParaRPr lang="en-US"/>
           </a:p>
@@ -1413,7 +1414,7 @@
           <a:p>
             <a:fld id="{D46B952B-F692-4DD1-9678-FCDA40C3FC40}" type="datetimeFigureOut">
               <a:rPr lang="en-US" smtClean="0"/>
-              <a:t>1/3/2020</a:t>
+              <a:t>1/24/2020</a:t>
             </a:fld>
             <a:endParaRPr lang="en-US"/>
           </a:p>
@@ -1825,7 +1826,7 @@
           <a:p>
             <a:fld id="{D46B952B-F692-4DD1-9678-FCDA40C3FC40}" type="datetimeFigureOut">
               <a:rPr lang="en-US" smtClean="0"/>
-              <a:t>1/3/2020</a:t>
+              <a:t>1/24/2020</a:t>
             </a:fld>
             <a:endParaRPr lang="en-US"/>
           </a:p>
@@ -1966,7 +1967,7 @@
           <a:p>
             <a:fld id="{D46B952B-F692-4DD1-9678-FCDA40C3FC40}" type="datetimeFigureOut">
               <a:rPr lang="en-US" smtClean="0"/>
-              <a:t>1/3/2020</a:t>
+              <a:t>1/24/2020</a:t>
             </a:fld>
             <a:endParaRPr lang="en-US"/>
           </a:p>
@@ -2079,7 +2080,7 @@
           <a:p>
             <a:fld id="{D46B952B-F692-4DD1-9678-FCDA40C3FC40}" type="datetimeFigureOut">
               <a:rPr lang="en-US" smtClean="0"/>
-              <a:t>1/3/2020</a:t>
+              <a:t>1/24/2020</a:t>
             </a:fld>
             <a:endParaRPr lang="en-US"/>
           </a:p>
@@ -2390,7 +2391,7 @@
           <a:p>
             <a:fld id="{D46B952B-F692-4DD1-9678-FCDA40C3FC40}" type="datetimeFigureOut">
               <a:rPr lang="en-US" smtClean="0"/>
-              <a:t>1/3/2020</a:t>
+              <a:t>1/24/2020</a:t>
             </a:fld>
             <a:endParaRPr lang="en-US"/>
           </a:p>
@@ -2678,7 +2679,7 @@
           <a:p>
             <a:fld id="{D46B952B-F692-4DD1-9678-FCDA40C3FC40}" type="datetimeFigureOut">
               <a:rPr lang="en-US" smtClean="0"/>
-              <a:t>1/3/2020</a:t>
+              <a:t>1/24/2020</a:t>
             </a:fld>
             <a:endParaRPr lang="en-US"/>
           </a:p>
@@ -2928,7 +2929,7 @@
           <a:p>
             <a:fld id="{D46B952B-F692-4DD1-9678-FCDA40C3FC40}" type="datetimeFigureOut">
               <a:rPr lang="en-US" smtClean="0"/>
-              <a:t>1/3/2020</a:t>
+              <a:t>1/24/2020</a:t>
             </a:fld>
             <a:endParaRPr lang="en-US"/>
           </a:p>
@@ -3455,6 +3456,339 @@
           <p:cNvPr id="2" name="Title 1">
             <a:extLst>
               <a:ext uri="{FF2B5EF4-FFF2-40B4-BE49-F238E27FC236}">
+                <a16:creationId xmlns:a16="http://schemas.microsoft.com/office/drawing/2014/main" id="{CF9ABAC4-3928-4B8F-9CAF-B4FB4CE0B043}"/>
+              </a:ext>
+            </a:extLst>
+          </p:cNvPr>
+          <p:cNvSpPr>
+            <a:spLocks noGrp="1"/>
+          </p:cNvSpPr>
+          <p:nvPr>
+            <p:ph type="title"/>
+          </p:nvPr>
+        </p:nvSpPr>
+        <p:spPr/>
+        <p:txBody>
+          <a:bodyPr/>
+          <a:lstStyle/>
+          <a:p>
+            <a:r>
+              <a:rPr lang="en-US" dirty="0"/>
+              <a:t>What data needs to be generated?</a:t>
+            </a:r>
+          </a:p>
+        </p:txBody>
+      </p:sp>
+      <p:sp>
+        <p:nvSpPr>
+          <p:cNvPr id="3" name="Content Placeholder 2">
+            <a:extLst>
+              <a:ext uri="{FF2B5EF4-FFF2-40B4-BE49-F238E27FC236}">
+                <a16:creationId xmlns:a16="http://schemas.microsoft.com/office/drawing/2014/main" id="{A532B01C-D55B-43FB-9F8A-1A9D36F34842}"/>
+              </a:ext>
+            </a:extLst>
+          </p:cNvPr>
+          <p:cNvSpPr>
+            <a:spLocks noGrp="1"/>
+          </p:cNvSpPr>
+          <p:nvPr>
+            <p:ph idx="1"/>
+          </p:nvPr>
+        </p:nvSpPr>
+        <p:spPr/>
+        <p:txBody>
+          <a:bodyPr/>
+          <a:lstStyle/>
+          <a:p>
+            <a:r>
+              <a:rPr lang="en-US" dirty="0"/>
+              <a:t>Username</a:t>
+            </a:r>
+          </a:p>
+          <a:p>
+            <a:r>
+              <a:rPr lang="en-US" dirty="0"/>
+              <a:t>Email address</a:t>
+            </a:r>
+          </a:p>
+          <a:p>
+            <a:r>
+              <a:rPr lang="en-US" dirty="0"/>
+              <a:t>Profile location</a:t>
+            </a:r>
+          </a:p>
+          <a:p>
+            <a:r>
+              <a:rPr lang="en-US" dirty="0"/>
+              <a:t>Group memberships</a:t>
+            </a:r>
+          </a:p>
+        </p:txBody>
+      </p:sp>
+    </p:spTree>
+    <p:extLst>
+      <p:ext uri="{BB962C8B-B14F-4D97-AF65-F5344CB8AC3E}">
+        <p14:creationId xmlns:p14="http://schemas.microsoft.com/office/powerpoint/2010/main" val="763643188"/>
+      </p:ext>
+    </p:extLst>
+  </p:cSld>
+  <p:clrMapOvr>
+    <a:masterClrMapping/>
+  </p:clrMapOvr>
+  <p:timing>
+    <p:tnLst>
+      <p:par>
+        <p:cTn id="1" dur="indefinite" restart="never" nodeType="tmRoot">
+          <p:childTnLst>
+            <p:seq concurrent="1" nextAc="seek">
+              <p:cTn id="2" dur="indefinite" nodeType="mainSeq">
+                <p:childTnLst>
+                  <p:par>
+                    <p:cTn id="3" fill="hold">
+                      <p:stCondLst>
+                        <p:cond delay="indefinite"/>
+                      </p:stCondLst>
+                      <p:childTnLst>
+                        <p:par>
+                          <p:cTn id="4" fill="hold">
+                            <p:stCondLst>
+                              <p:cond delay="0"/>
+                            </p:stCondLst>
+                            <p:childTnLst>
+                              <p:par>
+                                <p:cTn id="5" presetID="1" presetClass="entr" presetSubtype="0" fill="hold" grpId="0" nodeType="clickEffect">
+                                  <p:stCondLst>
+                                    <p:cond delay="0"/>
+                                  </p:stCondLst>
+                                  <p:childTnLst>
+                                    <p:set>
+                                      <p:cBhvr>
+                                        <p:cTn id="6" dur="1" fill="hold">
+                                          <p:stCondLst>
+                                            <p:cond delay="0"/>
+                                          </p:stCondLst>
+                                        </p:cTn>
+                                        <p:tgtEl>
+                                          <p:spTgt spid="3">
+                                            <p:txEl>
+                                              <p:pRg st="0" end="0"/>
+                                            </p:txEl>
+                                          </p:spTgt>
+                                        </p:tgtEl>
+                                        <p:attrNameLst>
+                                          <p:attrName>style.visibility</p:attrName>
+                                        </p:attrNameLst>
+                                      </p:cBhvr>
+                                      <p:to>
+                                        <p:strVal val="visible"/>
+                                      </p:to>
+                                    </p:set>
+                                  </p:childTnLst>
+                                </p:cTn>
+                              </p:par>
+                            </p:childTnLst>
+                          </p:cTn>
+                        </p:par>
+                      </p:childTnLst>
+                    </p:cTn>
+                  </p:par>
+                  <p:par>
+                    <p:cTn id="7" fill="hold">
+                      <p:stCondLst>
+                        <p:cond delay="indefinite"/>
+                      </p:stCondLst>
+                      <p:childTnLst>
+                        <p:par>
+                          <p:cTn id="8" fill="hold">
+                            <p:stCondLst>
+                              <p:cond delay="0"/>
+                            </p:stCondLst>
+                            <p:childTnLst>
+                              <p:par>
+                                <p:cTn id="9" presetID="1" presetClass="entr" presetSubtype="0" fill="hold" grpId="0" nodeType="clickEffect">
+                                  <p:stCondLst>
+                                    <p:cond delay="0"/>
+                                  </p:stCondLst>
+                                  <p:childTnLst>
+                                    <p:set>
+                                      <p:cBhvr>
+                                        <p:cTn id="10" dur="1" fill="hold">
+                                          <p:stCondLst>
+                                            <p:cond delay="0"/>
+                                          </p:stCondLst>
+                                        </p:cTn>
+                                        <p:tgtEl>
+                                          <p:spTgt spid="3">
+                                            <p:txEl>
+                                              <p:pRg st="1" end="1"/>
+                                            </p:txEl>
+                                          </p:spTgt>
+                                        </p:tgtEl>
+                                        <p:attrNameLst>
+                                          <p:attrName>style.visibility</p:attrName>
+                                        </p:attrNameLst>
+                                      </p:cBhvr>
+                                      <p:to>
+                                        <p:strVal val="visible"/>
+                                      </p:to>
+                                    </p:set>
+                                  </p:childTnLst>
+                                </p:cTn>
+                              </p:par>
+                            </p:childTnLst>
+                          </p:cTn>
+                        </p:par>
+                      </p:childTnLst>
+                    </p:cTn>
+                  </p:par>
+                  <p:par>
+                    <p:cTn id="11" fill="hold">
+                      <p:stCondLst>
+                        <p:cond delay="indefinite"/>
+                      </p:stCondLst>
+                      <p:childTnLst>
+                        <p:par>
+                          <p:cTn id="12" fill="hold">
+                            <p:stCondLst>
+                              <p:cond delay="0"/>
+                            </p:stCondLst>
+                            <p:childTnLst>
+                              <p:par>
+                                <p:cTn id="13" presetID="1" presetClass="entr" presetSubtype="0" fill="hold" grpId="0" nodeType="clickEffect">
+                                  <p:stCondLst>
+                                    <p:cond delay="0"/>
+                                  </p:stCondLst>
+                                  <p:childTnLst>
+                                    <p:set>
+                                      <p:cBhvr>
+                                        <p:cTn id="14" dur="1" fill="hold">
+                                          <p:stCondLst>
+                                            <p:cond delay="0"/>
+                                          </p:stCondLst>
+                                        </p:cTn>
+                                        <p:tgtEl>
+                                          <p:spTgt spid="3">
+                                            <p:txEl>
+                                              <p:pRg st="2" end="2"/>
+                                            </p:txEl>
+                                          </p:spTgt>
+                                        </p:tgtEl>
+                                        <p:attrNameLst>
+                                          <p:attrName>style.visibility</p:attrName>
+                                        </p:attrNameLst>
+                                      </p:cBhvr>
+                                      <p:to>
+                                        <p:strVal val="visible"/>
+                                      </p:to>
+                                    </p:set>
+                                  </p:childTnLst>
+                                </p:cTn>
+                              </p:par>
+                            </p:childTnLst>
+                          </p:cTn>
+                        </p:par>
+                      </p:childTnLst>
+                    </p:cTn>
+                  </p:par>
+                  <p:par>
+                    <p:cTn id="15" fill="hold">
+                      <p:stCondLst>
+                        <p:cond delay="indefinite"/>
+                      </p:stCondLst>
+                      <p:childTnLst>
+                        <p:par>
+                          <p:cTn id="16" fill="hold">
+                            <p:stCondLst>
+                              <p:cond delay="0"/>
+                            </p:stCondLst>
+                            <p:childTnLst>
+                              <p:par>
+                                <p:cTn id="17" presetID="1" presetClass="entr" presetSubtype="0" fill="hold" grpId="0" nodeType="clickEffect">
+                                  <p:stCondLst>
+                                    <p:cond delay="0"/>
+                                  </p:stCondLst>
+                                  <p:childTnLst>
+                                    <p:set>
+                                      <p:cBhvr>
+                                        <p:cTn id="18" dur="1" fill="hold">
+                                          <p:stCondLst>
+                                            <p:cond delay="0"/>
+                                          </p:stCondLst>
+                                        </p:cTn>
+                                        <p:tgtEl>
+                                          <p:spTgt spid="3">
+                                            <p:txEl>
+                                              <p:pRg st="3" end="3"/>
+                                            </p:txEl>
+                                          </p:spTgt>
+                                        </p:tgtEl>
+                                        <p:attrNameLst>
+                                          <p:attrName>style.visibility</p:attrName>
+                                        </p:attrNameLst>
+                                      </p:cBhvr>
+                                      <p:to>
+                                        <p:strVal val="visible"/>
+                                      </p:to>
+                                    </p:set>
+                                  </p:childTnLst>
+                                </p:cTn>
+                              </p:par>
+                            </p:childTnLst>
+                          </p:cTn>
+                        </p:par>
+                      </p:childTnLst>
+                    </p:cTn>
+                  </p:par>
+                </p:childTnLst>
+              </p:cTn>
+              <p:prevCondLst>
+                <p:cond evt="onPrev" delay="0">
+                  <p:tgtEl>
+                    <p:sldTgt/>
+                  </p:tgtEl>
+                </p:cond>
+              </p:prevCondLst>
+              <p:nextCondLst>
+                <p:cond evt="onNext" delay="0">
+                  <p:tgtEl>
+                    <p:sldTgt/>
+                  </p:tgtEl>
+                </p:cond>
+              </p:nextCondLst>
+            </p:seq>
+          </p:childTnLst>
+        </p:cTn>
+      </p:par>
+    </p:tnLst>
+    <p:bldLst>
+      <p:bldP spid="3" grpId="0" build="p"/>
+    </p:bldLst>
+  </p:timing>
+</p:sld>
+</file>
+
+<file path=ppt/slides/slide11.xml><?xml version="1.0" encoding="utf-8"?>
+<p:sld xmlns:a="http://schemas.openxmlformats.org/drawingml/2006/main" xmlns:r="http://schemas.openxmlformats.org/officeDocument/2006/relationships" xmlns:p="http://schemas.openxmlformats.org/presentationml/2006/main">
+  <p:cSld>
+    <p:spTree>
+      <p:nvGrpSpPr>
+        <p:cNvPr id="1" name=""/>
+        <p:cNvGrpSpPr/>
+        <p:nvPr/>
+      </p:nvGrpSpPr>
+      <p:grpSpPr>
+        <a:xfrm>
+          <a:off x="0" y="0"/>
+          <a:ext cx="0" cy="0"/>
+          <a:chOff x="0" y="0"/>
+          <a:chExt cx="0" cy="0"/>
+        </a:xfrm>
+      </p:grpSpPr>
+      <p:sp>
+        <p:nvSpPr>
+          <p:cNvPr id="2" name="Title 1">
+            <a:extLst>
+              <a:ext uri="{FF2B5EF4-FFF2-40B4-BE49-F238E27FC236}">
                 <a16:creationId xmlns:a16="http://schemas.microsoft.com/office/drawing/2014/main" id="{883A87D4-6C4C-4738-9D05-04287B68EBE5}"/>
               </a:ext>
             </a:extLst>
@@ -3659,7 +3993,7 @@
 </p:sld>
 </file>
 
-<file path=ppt/slides/slide11.xml><?xml version="1.0" encoding="utf-8"?>
+<file path=ppt/slides/slide12.xml><?xml version="1.0" encoding="utf-8"?>
 <p:sld xmlns:a="http://schemas.openxmlformats.org/drawingml/2006/main" xmlns:r="http://schemas.openxmlformats.org/officeDocument/2006/relationships" xmlns:p="http://schemas.openxmlformats.org/presentationml/2006/main">
   <p:cSld>
     <p:spTree>
@@ -5402,7 +5736,7 @@
           <p:cNvPr id="2" name="Title 1">
             <a:extLst>
               <a:ext uri="{FF2B5EF4-FFF2-40B4-BE49-F238E27FC236}">
-                <a16:creationId xmlns:a16="http://schemas.microsoft.com/office/drawing/2014/main" id="{70E2DA92-42EF-47E8-9999-901723F7C4B4}"/>
+                <a16:creationId xmlns:a16="http://schemas.microsoft.com/office/drawing/2014/main" id="{6B445590-C5DF-4079-A28D-84DF304EE848}"/>
               </a:ext>
             </a:extLst>
           </p:cNvPr>
@@ -5420,25 +5754,25 @@
           <a:p>
             <a:r>
               <a:rPr lang="en-US" dirty="0"/>
-              <a:t>User Onboarding</a:t>
-            </a:r>
-          </a:p>
-        </p:txBody>
-      </p:sp>
-      <p:sp>
-        <p:nvSpPr>
-          <p:cNvPr id="3" name="Text Placeholder 2">
-            <a:extLst>
-              <a:ext uri="{FF2B5EF4-FFF2-40B4-BE49-F238E27FC236}">
-                <a16:creationId xmlns:a16="http://schemas.microsoft.com/office/drawing/2014/main" id="{114BA69F-211E-4DE1-8C4C-7129073A4EDA}"/>
-              </a:ext>
-            </a:extLst>
-          </p:cNvPr>
-          <p:cNvSpPr>
-            <a:spLocks noGrp="1"/>
-          </p:cNvSpPr>
-          <p:nvPr>
-            <p:ph type="body" idx="1"/>
+              <a:t>Demo Environment</a:t>
+            </a:r>
+          </a:p>
+        </p:txBody>
+      </p:sp>
+      <p:sp>
+        <p:nvSpPr>
+          <p:cNvPr id="3" name="Content Placeholder 2">
+            <a:extLst>
+              <a:ext uri="{FF2B5EF4-FFF2-40B4-BE49-F238E27FC236}">
+                <a16:creationId xmlns:a16="http://schemas.microsoft.com/office/drawing/2014/main" id="{13E88D65-6251-4F3F-90EC-F6190E69AEA0}"/>
+              </a:ext>
+            </a:extLst>
+          </p:cNvPr>
+          <p:cNvSpPr>
+            <a:spLocks noGrp="1"/>
+          </p:cNvSpPr>
+          <p:nvPr>
+            <p:ph idx="1"/>
           </p:nvPr>
         </p:nvSpPr>
         <p:spPr/>
@@ -5446,6 +5780,28 @@
           <a:bodyPr/>
           <a:lstStyle/>
           <a:p>
+            <a:r>
+              <a:rPr lang="en-US" dirty="0"/>
+              <a:t>Windows 10 client</a:t>
+            </a:r>
+          </a:p>
+          <a:p>
+            <a:r>
+              <a:rPr lang="en-US" dirty="0"/>
+              <a:t>Windows Server 2016 DC</a:t>
+            </a:r>
+          </a:p>
+          <a:p>
+            <a:r>
+              <a:rPr lang="en-US" dirty="0"/>
+              <a:t>VS Code (latest version)</a:t>
+            </a:r>
+          </a:p>
+          <a:p>
+            <a:r>
+              <a:rPr lang="en-US"/>
+              <a:t>PowerShell 5.1</a:t>
+            </a:r>
             <a:endParaRPr lang="en-US" dirty="0"/>
           </a:p>
         </p:txBody>
@@ -5453,7 +5809,7 @@
     </p:spTree>
     <p:extLst>
       <p:ext uri="{BB962C8B-B14F-4D97-AF65-F5344CB8AC3E}">
-        <p14:creationId xmlns:p14="http://schemas.microsoft.com/office/powerpoint/2010/main" val="3614374358"/>
+        <p14:creationId xmlns:p14="http://schemas.microsoft.com/office/powerpoint/2010/main" val="925715389"/>
       </p:ext>
     </p:extLst>
   </p:cSld>
@@ -5485,7 +5841,7 @@
           <p:cNvPr id="2" name="Title 1">
             <a:extLst>
               <a:ext uri="{FF2B5EF4-FFF2-40B4-BE49-F238E27FC236}">
-                <a16:creationId xmlns:a16="http://schemas.microsoft.com/office/drawing/2014/main" id="{40C62488-183C-4397-98BC-AD3EA2D430F2}"/>
+                <a16:creationId xmlns:a16="http://schemas.microsoft.com/office/drawing/2014/main" id="{70E2DA92-42EF-47E8-9999-901723F7C4B4}"/>
               </a:ext>
             </a:extLst>
           </p:cNvPr>
@@ -5503,25 +5859,25 @@
           <a:p>
             <a:r>
               <a:rPr lang="en-US" dirty="0"/>
-              <a:t>Where is your data coming from?</a:t>
-            </a:r>
-          </a:p>
-        </p:txBody>
-      </p:sp>
-      <p:sp>
-        <p:nvSpPr>
-          <p:cNvPr id="3" name="Content Placeholder 2">
-            <a:extLst>
-              <a:ext uri="{FF2B5EF4-FFF2-40B4-BE49-F238E27FC236}">
-                <a16:creationId xmlns:a16="http://schemas.microsoft.com/office/drawing/2014/main" id="{68748B4A-55E1-40FB-927B-FB3A68A560C8}"/>
-              </a:ext>
-            </a:extLst>
-          </p:cNvPr>
-          <p:cNvSpPr>
-            <a:spLocks noGrp="1"/>
-          </p:cNvSpPr>
-          <p:nvPr>
-            <p:ph idx="1"/>
+              <a:t>User Onboarding</a:t>
+            </a:r>
+          </a:p>
+        </p:txBody>
+      </p:sp>
+      <p:sp>
+        <p:nvSpPr>
+          <p:cNvPr id="3" name="Text Placeholder 2">
+            <a:extLst>
+              <a:ext uri="{FF2B5EF4-FFF2-40B4-BE49-F238E27FC236}">
+                <a16:creationId xmlns:a16="http://schemas.microsoft.com/office/drawing/2014/main" id="{114BA69F-211E-4DE1-8C4C-7129073A4EDA}"/>
+              </a:ext>
+            </a:extLst>
+          </p:cNvPr>
+          <p:cNvSpPr>
+            <a:spLocks noGrp="1"/>
+          </p:cNvSpPr>
+          <p:nvPr>
+            <p:ph type="body" idx="1"/>
           </p:nvPr>
         </p:nvSpPr>
         <p:spPr/>
@@ -5529,270 +5885,20 @@
           <a:bodyPr/>
           <a:lstStyle/>
           <a:p>
-            <a:r>
-              <a:rPr lang="en-US" dirty="0"/>
-              <a:t>HR system API</a:t>
-            </a:r>
-          </a:p>
-          <a:p>
-            <a:r>
-              <a:rPr lang="en-US" dirty="0"/>
-              <a:t>Spreadsheet</a:t>
-            </a:r>
-          </a:p>
-          <a:p>
-            <a:r>
-              <a:rPr lang="en-US" dirty="0"/>
-              <a:t>Email</a:t>
-            </a:r>
-          </a:p>
-          <a:p>
-            <a:r>
-              <a:rPr lang="en-US" dirty="0"/>
-              <a:t>Shouts across the cube farm</a:t>
-            </a:r>
+            <a:endParaRPr lang="en-US" dirty="0"/>
           </a:p>
         </p:txBody>
       </p:sp>
     </p:spTree>
     <p:extLst>
       <p:ext uri="{BB962C8B-B14F-4D97-AF65-F5344CB8AC3E}">
-        <p14:creationId xmlns:p14="http://schemas.microsoft.com/office/powerpoint/2010/main" val="2940591443"/>
+        <p14:creationId xmlns:p14="http://schemas.microsoft.com/office/powerpoint/2010/main" val="3614374358"/>
       </p:ext>
     </p:extLst>
   </p:cSld>
   <p:clrMapOvr>
     <a:masterClrMapping/>
   </p:clrMapOvr>
-  <p:timing>
-    <p:tnLst>
-      <p:par>
-        <p:cTn id="1" dur="indefinite" restart="never" nodeType="tmRoot">
-          <p:childTnLst>
-            <p:seq concurrent="1" nextAc="seek">
-              <p:cTn id="2" dur="indefinite" nodeType="mainSeq">
-                <p:childTnLst>
-                  <p:par>
-                    <p:cTn id="3" fill="hold">
-                      <p:stCondLst>
-                        <p:cond delay="indefinite"/>
-                      </p:stCondLst>
-                      <p:childTnLst>
-                        <p:par>
-                          <p:cTn id="4" fill="hold">
-                            <p:stCondLst>
-                              <p:cond delay="0"/>
-                            </p:stCondLst>
-                            <p:childTnLst>
-                              <p:par>
-                                <p:cTn id="5" presetID="1" presetClass="entr" presetSubtype="0" fill="hold" grpId="0" nodeType="clickEffect">
-                                  <p:stCondLst>
-                                    <p:cond delay="0"/>
-                                  </p:stCondLst>
-                                  <p:childTnLst>
-                                    <p:set>
-                                      <p:cBhvr>
-                                        <p:cTn id="6" dur="1" fill="hold">
-                                          <p:stCondLst>
-                                            <p:cond delay="0"/>
-                                          </p:stCondLst>
-                                        </p:cTn>
-                                        <p:tgtEl>
-                                          <p:spTgt spid="3">
-                                            <p:txEl>
-                                              <p:pRg st="0" end="0"/>
-                                            </p:txEl>
-                                          </p:spTgt>
-                                        </p:tgtEl>
-                                        <p:attrNameLst>
-                                          <p:attrName>style.visibility</p:attrName>
-                                        </p:attrNameLst>
-                                      </p:cBhvr>
-                                      <p:to>
-                                        <p:strVal val="visible"/>
-                                      </p:to>
-                                    </p:set>
-                                  </p:childTnLst>
-                                </p:cTn>
-                              </p:par>
-                            </p:childTnLst>
-                          </p:cTn>
-                        </p:par>
-                      </p:childTnLst>
-                    </p:cTn>
-                  </p:par>
-                  <p:par>
-                    <p:cTn id="7" fill="hold">
-                      <p:stCondLst>
-                        <p:cond delay="indefinite"/>
-                      </p:stCondLst>
-                      <p:childTnLst>
-                        <p:par>
-                          <p:cTn id="8" fill="hold">
-                            <p:stCondLst>
-                              <p:cond delay="0"/>
-                            </p:stCondLst>
-                            <p:childTnLst>
-                              <p:par>
-                                <p:cTn id="9" presetID="1" presetClass="entr" presetSubtype="0" fill="hold" grpId="0" nodeType="clickEffect">
-                                  <p:stCondLst>
-                                    <p:cond delay="0"/>
-                                  </p:stCondLst>
-                                  <p:childTnLst>
-                                    <p:set>
-                                      <p:cBhvr>
-                                        <p:cTn id="10" dur="1" fill="hold">
-                                          <p:stCondLst>
-                                            <p:cond delay="0"/>
-                                          </p:stCondLst>
-                                        </p:cTn>
-                                        <p:tgtEl>
-                                          <p:spTgt spid="3">
-                                            <p:txEl>
-                                              <p:pRg st="1" end="1"/>
-                                            </p:txEl>
-                                          </p:spTgt>
-                                        </p:tgtEl>
-                                        <p:attrNameLst>
-                                          <p:attrName>style.visibility</p:attrName>
-                                        </p:attrNameLst>
-                                      </p:cBhvr>
-                                      <p:to>
-                                        <p:strVal val="visible"/>
-                                      </p:to>
-                                    </p:set>
-                                  </p:childTnLst>
-                                </p:cTn>
-                              </p:par>
-                            </p:childTnLst>
-                          </p:cTn>
-                        </p:par>
-                      </p:childTnLst>
-                    </p:cTn>
-                  </p:par>
-                  <p:par>
-                    <p:cTn id="11" fill="hold">
-                      <p:stCondLst>
-                        <p:cond delay="indefinite"/>
-                      </p:stCondLst>
-                      <p:childTnLst>
-                        <p:par>
-                          <p:cTn id="12" fill="hold">
-                            <p:stCondLst>
-                              <p:cond delay="0"/>
-                            </p:stCondLst>
-                            <p:childTnLst>
-                              <p:par>
-                                <p:cTn id="13" presetID="1" presetClass="entr" presetSubtype="0" fill="hold" grpId="0" nodeType="clickEffect">
-                                  <p:stCondLst>
-                                    <p:cond delay="0"/>
-                                  </p:stCondLst>
-                                  <p:childTnLst>
-                                    <p:set>
-                                      <p:cBhvr>
-                                        <p:cTn id="14" dur="1" fill="hold">
-                                          <p:stCondLst>
-                                            <p:cond delay="0"/>
-                                          </p:stCondLst>
-                                        </p:cTn>
-                                        <p:tgtEl>
-                                          <p:spTgt spid="3">
-                                            <p:txEl>
-                                              <p:pRg st="2" end="2"/>
-                                            </p:txEl>
-                                          </p:spTgt>
-                                        </p:tgtEl>
-                                        <p:attrNameLst>
-                                          <p:attrName>style.visibility</p:attrName>
-                                        </p:attrNameLst>
-                                      </p:cBhvr>
-                                      <p:to>
-                                        <p:strVal val="visible"/>
-                                      </p:to>
-                                    </p:set>
-                                  </p:childTnLst>
-                                </p:cTn>
-                              </p:par>
-                            </p:childTnLst>
-                          </p:cTn>
-                        </p:par>
-                      </p:childTnLst>
-                    </p:cTn>
-                  </p:par>
-                  <p:par>
-                    <p:cTn id="15" fill="hold">
-                      <p:stCondLst>
-                        <p:cond delay="indefinite"/>
-                      </p:stCondLst>
-                      <p:childTnLst>
-                        <p:par>
-                          <p:cTn id="16" fill="hold">
-                            <p:stCondLst>
-                              <p:cond delay="0"/>
-                            </p:stCondLst>
-                            <p:childTnLst>
-                              <p:par>
-                                <p:cTn id="17" presetID="1" presetClass="entr" presetSubtype="0" fill="hold" grpId="0" nodeType="clickEffect">
-                                  <p:stCondLst>
-                                    <p:cond delay="0"/>
-                                  </p:stCondLst>
-                                  <p:childTnLst>
-                                    <p:set>
-                                      <p:cBhvr>
-                                        <p:cTn id="18" dur="1" fill="hold">
-                                          <p:stCondLst>
-                                            <p:cond delay="0"/>
-                                          </p:stCondLst>
-                                        </p:cTn>
-                                        <p:tgtEl>
-                                          <p:spTgt spid="3">
-                                            <p:txEl>
-                                              <p:pRg st="3" end="3"/>
-                                            </p:txEl>
-                                          </p:spTgt>
-                                        </p:tgtEl>
-                                        <p:attrNameLst>
-                                          <p:attrName>style.visibility</p:attrName>
-                                        </p:attrNameLst>
-                                      </p:cBhvr>
-                                      <p:to>
-                                        <p:strVal val="visible"/>
-                                      </p:to>
-                                    </p:set>
-                                  </p:childTnLst>
-                                </p:cTn>
-                              </p:par>
-                            </p:childTnLst>
-                          </p:cTn>
-                        </p:par>
-                      </p:childTnLst>
-                    </p:cTn>
-                  </p:par>
-                </p:childTnLst>
-              </p:cTn>
-              <p:prevCondLst>
-                <p:cond evt="onPrev" delay="0">
-                  <p:tgtEl>
-                    <p:sldTgt/>
-                  </p:tgtEl>
-                </p:cond>
-              </p:prevCondLst>
-              <p:nextCondLst>
-                <p:cond evt="onNext" delay="0">
-                  <p:tgtEl>
-                    <p:sldTgt/>
-                  </p:tgtEl>
-                </p:cond>
-              </p:nextCondLst>
-            </p:seq>
-          </p:childTnLst>
-        </p:cTn>
-      </p:par>
-    </p:tnLst>
-    <p:bldLst>
-      <p:bldP spid="3" grpId="0" build="p"/>
-    </p:bldLst>
-  </p:timing>
 </p:sld>
 </file>
 
@@ -5818,7 +5924,7 @@
           <p:cNvPr id="2" name="Title 1">
             <a:extLst>
               <a:ext uri="{FF2B5EF4-FFF2-40B4-BE49-F238E27FC236}">
-                <a16:creationId xmlns:a16="http://schemas.microsoft.com/office/drawing/2014/main" id="{CF9ABAC4-3928-4B8F-9CAF-B4FB4CE0B043}"/>
+                <a16:creationId xmlns:a16="http://schemas.microsoft.com/office/drawing/2014/main" id="{40C62488-183C-4397-98BC-AD3EA2D430F2}"/>
               </a:ext>
             </a:extLst>
           </p:cNvPr>
@@ -5836,7 +5942,7 @@
           <a:p>
             <a:r>
               <a:rPr lang="en-US" dirty="0"/>
-              <a:t>What data needs to be generated?</a:t>
+              <a:t>Where is your data coming from?</a:t>
             </a:r>
           </a:p>
         </p:txBody>
@@ -5846,7 +5952,7 @@
           <p:cNvPr id="3" name="Content Placeholder 2">
             <a:extLst>
               <a:ext uri="{FF2B5EF4-FFF2-40B4-BE49-F238E27FC236}">
-                <a16:creationId xmlns:a16="http://schemas.microsoft.com/office/drawing/2014/main" id="{A532B01C-D55B-43FB-9F8A-1A9D36F34842}"/>
+                <a16:creationId xmlns:a16="http://schemas.microsoft.com/office/drawing/2014/main" id="{68748B4A-55E1-40FB-927B-FB3A68A560C8}"/>
               </a:ext>
             </a:extLst>
           </p:cNvPr>
@@ -5864,25 +5970,25 @@
           <a:p>
             <a:r>
               <a:rPr lang="en-US" dirty="0"/>
-              <a:t>Username</a:t>
+              <a:t>HR system API</a:t>
             </a:r>
           </a:p>
           <a:p>
             <a:r>
               <a:rPr lang="en-US" dirty="0"/>
-              <a:t>Email address</a:t>
+              <a:t>Spreadsheet</a:t>
             </a:r>
           </a:p>
           <a:p>
             <a:r>
               <a:rPr lang="en-US" dirty="0"/>
-              <a:t>Profile location</a:t>
+              <a:t>Email</a:t>
             </a:r>
           </a:p>
           <a:p>
             <a:r>
               <a:rPr lang="en-US" dirty="0"/>
-              <a:t>Group memberships</a:t>
+              <a:t>Shouts across the cube farm</a:t>
             </a:r>
           </a:p>
         </p:txBody>
@@ -5890,7 +5996,7 @@
     </p:spTree>
     <p:extLst>
       <p:ext uri="{BB962C8B-B14F-4D97-AF65-F5344CB8AC3E}">
-        <p14:creationId xmlns:p14="http://schemas.microsoft.com/office/powerpoint/2010/main" val="763643188"/>
+        <p14:creationId xmlns:p14="http://schemas.microsoft.com/office/powerpoint/2010/main" val="2940591443"/>
       </p:ext>
     </p:extLst>
   </p:cSld>

</xml_diff>

<commit_message>
properly referenced 'windows' ps in the pptx
</commit_message>
<xml_diff>
--- a/2020-01-30 - MTX Portland - AD User Lifecycle/MTX Portland - Automating AD User Lifecycle.pptx
+++ b/2020-01-30 - MTX Portland - AD User Lifecycle/MTX Portland - Automating AD User Lifecycle.pptx
@@ -270,7 +270,7 @@
           <a:p>
             <a:fld id="{D46B952B-F692-4DD1-9678-FCDA40C3FC40}" type="datetimeFigureOut">
               <a:rPr lang="en-US" smtClean="0"/>
-              <a:t>1/24/2020</a:t>
+              <a:t>1/29/2020</a:t>
             </a:fld>
             <a:endParaRPr lang="en-US"/>
           </a:p>
@@ -468,7 +468,7 @@
           <a:p>
             <a:fld id="{D46B952B-F692-4DD1-9678-FCDA40C3FC40}" type="datetimeFigureOut">
               <a:rPr lang="en-US" smtClean="0"/>
-              <a:t>1/24/2020</a:t>
+              <a:t>1/29/2020</a:t>
             </a:fld>
             <a:endParaRPr lang="en-US"/>
           </a:p>
@@ -676,7 +676,7 @@
           <a:p>
             <a:fld id="{D46B952B-F692-4DD1-9678-FCDA40C3FC40}" type="datetimeFigureOut">
               <a:rPr lang="en-US" smtClean="0"/>
-              <a:t>1/24/2020</a:t>
+              <a:t>1/29/2020</a:t>
             </a:fld>
             <a:endParaRPr lang="en-US"/>
           </a:p>
@@ -874,7 +874,7 @@
           <a:p>
             <a:fld id="{D46B952B-F692-4DD1-9678-FCDA40C3FC40}" type="datetimeFigureOut">
               <a:rPr lang="en-US" smtClean="0"/>
-              <a:t>1/24/2020</a:t>
+              <a:t>1/29/2020</a:t>
             </a:fld>
             <a:endParaRPr lang="en-US"/>
           </a:p>
@@ -1149,7 +1149,7 @@
           <a:p>
             <a:fld id="{D46B952B-F692-4DD1-9678-FCDA40C3FC40}" type="datetimeFigureOut">
               <a:rPr lang="en-US" smtClean="0"/>
-              <a:t>1/24/2020</a:t>
+              <a:t>1/29/2020</a:t>
             </a:fld>
             <a:endParaRPr lang="en-US"/>
           </a:p>
@@ -1414,7 +1414,7 @@
           <a:p>
             <a:fld id="{D46B952B-F692-4DD1-9678-FCDA40C3FC40}" type="datetimeFigureOut">
               <a:rPr lang="en-US" smtClean="0"/>
-              <a:t>1/24/2020</a:t>
+              <a:t>1/29/2020</a:t>
             </a:fld>
             <a:endParaRPr lang="en-US"/>
           </a:p>
@@ -1826,7 +1826,7 @@
           <a:p>
             <a:fld id="{D46B952B-F692-4DD1-9678-FCDA40C3FC40}" type="datetimeFigureOut">
               <a:rPr lang="en-US" smtClean="0"/>
-              <a:t>1/24/2020</a:t>
+              <a:t>1/29/2020</a:t>
             </a:fld>
             <a:endParaRPr lang="en-US"/>
           </a:p>
@@ -1967,7 +1967,7 @@
           <a:p>
             <a:fld id="{D46B952B-F692-4DD1-9678-FCDA40C3FC40}" type="datetimeFigureOut">
               <a:rPr lang="en-US" smtClean="0"/>
-              <a:t>1/24/2020</a:t>
+              <a:t>1/29/2020</a:t>
             </a:fld>
             <a:endParaRPr lang="en-US"/>
           </a:p>
@@ -2080,7 +2080,7 @@
           <a:p>
             <a:fld id="{D46B952B-F692-4DD1-9678-FCDA40C3FC40}" type="datetimeFigureOut">
               <a:rPr lang="en-US" smtClean="0"/>
-              <a:t>1/24/2020</a:t>
+              <a:t>1/29/2020</a:t>
             </a:fld>
             <a:endParaRPr lang="en-US"/>
           </a:p>
@@ -2391,7 +2391,7 @@
           <a:p>
             <a:fld id="{D46B952B-F692-4DD1-9678-FCDA40C3FC40}" type="datetimeFigureOut">
               <a:rPr lang="en-US" smtClean="0"/>
-              <a:t>1/24/2020</a:t>
+              <a:t>1/29/2020</a:t>
             </a:fld>
             <a:endParaRPr lang="en-US"/>
           </a:p>
@@ -2679,7 +2679,7 @@
           <a:p>
             <a:fld id="{D46B952B-F692-4DD1-9678-FCDA40C3FC40}" type="datetimeFigureOut">
               <a:rPr lang="en-US" smtClean="0"/>
-              <a:t>1/24/2020</a:t>
+              <a:t>1/29/2020</a:t>
             </a:fld>
             <a:endParaRPr lang="en-US"/>
           </a:p>
@@ -2929,7 +2929,7 @@
           <a:p>
             <a:fld id="{D46B952B-F692-4DD1-9678-FCDA40C3FC40}" type="datetimeFigureOut">
               <a:rPr lang="en-US" smtClean="0"/>
-              <a:t>1/24/2020</a:t>
+              <a:t>1/29/2020</a:t>
             </a:fld>
             <a:endParaRPr lang="en-US"/>
           </a:p>
@@ -5800,9 +5800,12 @@
           <a:p>
             <a:r>
               <a:rPr lang="en-US"/>
-              <a:t>PowerShell 5.1</a:t>
-            </a:r>
-            <a:endParaRPr lang="en-US" dirty="0"/>
+              <a:t>Windows PowerShell </a:t>
+            </a:r>
+            <a:r>
+              <a:rPr lang="en-US" dirty="0"/>
+              <a:t>5.1</a:t>
+            </a:r>
           </a:p>
         </p:txBody>
       </p:sp>

</xml_diff>